<commit_message>
shiby publish needs to add data; edited pptx itself
</commit_message>
<xml_diff>
--- a/Data Reporting/FacultyTenureAnalysis.pptx
+++ b/Data Reporting/FacultyTenureAnalysis.pptx
@@ -1,11 +1,11 @@
 
 <file path=ppt/presentation.xml><?xml version="1.0" encoding="utf-8"?>
-<p:presentation xmlns:a="http://schemas.openxmlformats.org/drawingml/2006/main" xmlns:p="http://schemas.openxmlformats.org/presentationml/2006/main" xmlns:r="http://schemas.openxmlformats.org/officeDocument/2006/relationships" autoCompressPictures="0" saveSubsetFonts="1">
+<p:presentation xmlns:a="http://schemas.openxmlformats.org/drawingml/2006/main" xmlns:r="http://schemas.openxmlformats.org/officeDocument/2006/relationships" xmlns:p="http://schemas.openxmlformats.org/presentationml/2006/main" saveSubsetFonts="1" autoCompressPictures="0">
   <p:sldMasterIdLst>
     <p:sldMasterId id="2147483648" r:id="rId1"/>
   </p:sldMasterIdLst>
   <p:notesMasterIdLst>
-    <p:notesMasterId r:id="rId13"/>
+    <p:notesMasterId r:id="rId10"/>
   </p:notesMasterIdLst>
   <p:sldIdLst>
     <p:sldId id="256" r:id="rId2"/>
@@ -16,9 +16,6 @@
     <p:sldId id="261" r:id="rId7"/>
     <p:sldId id="262" r:id="rId8"/>
     <p:sldId id="263" r:id="rId9"/>
-    <p:sldId id="264" r:id="rId10"/>
-    <p:sldId id="265" r:id="rId11"/>
-    <p:sldId id="266" r:id="rId12"/>
   </p:sldIdLst>
   <p:sldSz cx="9144000" cy="5143500" type="screen16x9"/>
   <p:notesSz cx="6858000" cy="9144000"/>
@@ -26,8 +23,8 @@
     <a:defPPr>
       <a:defRPr lang="en-US"/>
     </a:defPPr>
-    <a:lvl1pPr algn="l" defTabSz="457200" eaLnBrk="1" hangingPunct="1" latinLnBrk="0" marL="0" rtl="0">
-      <a:defRPr kern="1200" sz="1800">
+    <a:lvl1pPr marL="0" algn="l" defTabSz="457200" rtl="0" eaLnBrk="1" latinLnBrk="0" hangingPunct="1">
+      <a:defRPr sz="1800" kern="1200">
         <a:solidFill>
           <a:schemeClr val="tx1"/>
         </a:solidFill>
@@ -36,8 +33,8 @@
         <a:cs typeface="+mn-cs"/>
       </a:defRPr>
     </a:lvl1pPr>
-    <a:lvl2pPr algn="l" defTabSz="457200" eaLnBrk="1" hangingPunct="1" latinLnBrk="0" marL="457200" rtl="0">
-      <a:defRPr kern="1200" sz="1800">
+    <a:lvl2pPr marL="457200" algn="l" defTabSz="457200" rtl="0" eaLnBrk="1" latinLnBrk="0" hangingPunct="1">
+      <a:defRPr sz="1800" kern="1200">
         <a:solidFill>
           <a:schemeClr val="tx1"/>
         </a:solidFill>
@@ -46,8 +43,8 @@
         <a:cs typeface="+mn-cs"/>
       </a:defRPr>
     </a:lvl2pPr>
-    <a:lvl3pPr algn="l" defTabSz="457200" eaLnBrk="1" hangingPunct="1" latinLnBrk="0" marL="914400" rtl="0">
-      <a:defRPr kern="1200" sz="1800">
+    <a:lvl3pPr marL="914400" algn="l" defTabSz="457200" rtl="0" eaLnBrk="1" latinLnBrk="0" hangingPunct="1">
+      <a:defRPr sz="1800" kern="1200">
         <a:solidFill>
           <a:schemeClr val="tx1"/>
         </a:solidFill>
@@ -56,8 +53,8 @@
         <a:cs typeface="+mn-cs"/>
       </a:defRPr>
     </a:lvl3pPr>
-    <a:lvl4pPr algn="l" defTabSz="457200" eaLnBrk="1" hangingPunct="1" latinLnBrk="0" marL="1371600" rtl="0">
-      <a:defRPr kern="1200" sz="1800">
+    <a:lvl4pPr marL="1371600" algn="l" defTabSz="457200" rtl="0" eaLnBrk="1" latinLnBrk="0" hangingPunct="1">
+      <a:defRPr sz="1800" kern="1200">
         <a:solidFill>
           <a:schemeClr val="tx1"/>
         </a:solidFill>
@@ -66,8 +63,8 @@
         <a:cs typeface="+mn-cs"/>
       </a:defRPr>
     </a:lvl4pPr>
-    <a:lvl5pPr algn="l" defTabSz="457200" eaLnBrk="1" hangingPunct="1" latinLnBrk="0" marL="1828800" rtl="0">
-      <a:defRPr kern="1200" sz="1800">
+    <a:lvl5pPr marL="1828800" algn="l" defTabSz="457200" rtl="0" eaLnBrk="1" latinLnBrk="0" hangingPunct="1">
+      <a:defRPr sz="1800" kern="1200">
         <a:solidFill>
           <a:schemeClr val="tx1"/>
         </a:solidFill>
@@ -76,8 +73,8 @@
         <a:cs typeface="+mn-cs"/>
       </a:defRPr>
     </a:lvl5pPr>
-    <a:lvl6pPr algn="l" defTabSz="457200" eaLnBrk="1" hangingPunct="1" latinLnBrk="0" marL="2286000" rtl="0">
-      <a:defRPr kern="1200" sz="1800">
+    <a:lvl6pPr marL="2286000" algn="l" defTabSz="457200" rtl="0" eaLnBrk="1" latinLnBrk="0" hangingPunct="1">
+      <a:defRPr sz="1800" kern="1200">
         <a:solidFill>
           <a:schemeClr val="tx1"/>
         </a:solidFill>
@@ -86,8 +83,8 @@
         <a:cs typeface="+mn-cs"/>
       </a:defRPr>
     </a:lvl6pPr>
-    <a:lvl7pPr algn="l" defTabSz="457200" eaLnBrk="1" hangingPunct="1" latinLnBrk="0" marL="2743200" rtl="0">
-      <a:defRPr kern="1200" sz="1800">
+    <a:lvl7pPr marL="2743200" algn="l" defTabSz="457200" rtl="0" eaLnBrk="1" latinLnBrk="0" hangingPunct="1">
+      <a:defRPr sz="1800" kern="1200">
         <a:solidFill>
           <a:schemeClr val="tx1"/>
         </a:solidFill>
@@ -96,8 +93,8 @@
         <a:cs typeface="+mn-cs"/>
       </a:defRPr>
     </a:lvl7pPr>
-    <a:lvl8pPr algn="l" defTabSz="457200" eaLnBrk="1" hangingPunct="1" latinLnBrk="0" marL="3200400" rtl="0">
-      <a:defRPr kern="1200" sz="1800">
+    <a:lvl8pPr marL="3200400" algn="l" defTabSz="457200" rtl="0" eaLnBrk="1" latinLnBrk="0" hangingPunct="1">
+      <a:defRPr sz="1800" kern="1200">
         <a:solidFill>
           <a:schemeClr val="tx1"/>
         </a:solidFill>
@@ -106,8 +103,8 @@
         <a:cs typeface="+mn-cs"/>
       </a:defRPr>
     </a:lvl8pPr>
-    <a:lvl9pPr algn="l" defTabSz="457200" eaLnBrk="1" hangingPunct="1" latinLnBrk="0" marL="3657600" rtl="0">
-      <a:defRPr kern="1200" sz="1800">
+    <a:lvl9pPr marL="3657600" algn="l" defTabSz="457200" rtl="0" eaLnBrk="1" latinLnBrk="0" hangingPunct="1">
+      <a:defRPr sz="1800" kern="1200">
         <a:solidFill>
           <a:schemeClr val="tx1"/>
         </a:solidFill>
@@ -218,7 +215,7 @@
           <a:p>
             <a:fld id="{0F9C1CCF-B725-44A7-AA57-5E433BD85C9F}" type="datetimeFigureOut">
               <a:rPr lang="en-US" smtClean="0"/>
-              <a:t>1/2/22</a:t>
+              <a:t>9/8/22</a:t>
             </a:fld>
             <a:endParaRPr lang="en-US"/>
           </a:p>
@@ -531,31 +528,30 @@
           <a:p>
             <a:pPr lvl="0"/>
             <a:r>
-              <a:rPr/>
               <a:t>Tenured percentage has been increased since 2016 from 40% to 44% in 2021, with 2020 being the highest 45%.</a:t>
             </a:r>
           </a:p>
           <a:p>
-            <a:pPr lvl="0" indent="0" marL="0">
+            <a:pPr marL="0" lvl="0" indent="0">
               <a:buNone/>
             </a:pPr>
+            <a:endParaRPr/>
           </a:p>
           <a:p>
             <a:pPr lvl="0"/>
             <a:r>
-              <a:rPr/>
               <a:t>Non-Tenure-line Faculty percentage has been decreased from 60% to 56%, with 2020 being the lowest 55%.</a:t>
             </a:r>
           </a:p>
           <a:p>
-            <a:pPr lvl="0" indent="0" marL="0">
+            <a:pPr marL="0" lvl="0" indent="0">
               <a:buNone/>
             </a:pPr>
+            <a:endParaRPr/>
           </a:p>
           <a:p>
             <a:pPr lvl="0"/>
             <a:r>
-              <a:rPr/>
               <a:t>There are still 12% less Tenure-line Faculty than non tenured.</a:t>
             </a:r>
           </a:p>
@@ -586,6 +582,9 @@
       </p:sp>
     </p:spTree>
   </p:cSld>
+  <p:clrMapOvr>
+    <a:masterClrMapping/>
+  </p:clrMapOvr>
 </p:notes>
 </file>
 
@@ -635,31 +634,30 @@
           <a:p>
             <a:pPr lvl="0"/>
             <a:r>
-              <a:rPr/>
               <a:t>Assistant professor tenure-line proportion dropped from 63% in 2016 to 57% in 2017 and became the lowest across professor ranks. However, the proportion but has been increasing ever since and reached 75% in 2021.</a:t>
             </a:r>
           </a:p>
           <a:p>
-            <a:pPr lvl="0" indent="0" marL="0">
+            <a:pPr marL="0" lvl="0" indent="0">
               <a:buNone/>
             </a:pPr>
+            <a:endParaRPr/>
           </a:p>
           <a:p>
             <a:pPr lvl="0"/>
             <a:r>
-              <a:rPr/>
               <a:t>Professor experienced a slight drop from 68% in 2016 to 65% in 2018, but has increased ever since and reached 73% in 2021.</a:t>
             </a:r>
           </a:p>
           <a:p>
-            <a:pPr lvl="0" indent="0" marL="0">
+            <a:pPr marL="0" lvl="0" indent="0">
               <a:buNone/>
             </a:pPr>
+            <a:endParaRPr/>
           </a:p>
           <a:p>
             <a:pPr lvl="0"/>
             <a:r>
-              <a:rPr/>
               <a:t>Associate professor has slight increase from 63% in 2016 to 66% in 2019, but dropped to 60% in 2021.</a:t>
             </a:r>
           </a:p>
@@ -690,6 +688,9 @@
       </p:sp>
     </p:spTree>
   </p:cSld>
+  <p:clrMapOvr>
+    <a:masterClrMapping/>
+  </p:clrMapOvr>
 </p:notes>
 </file>
 
@@ -739,86 +740,84 @@
           <a:p>
             <a:pPr lvl="0"/>
             <a:r>
-              <a:rPr/>
               <a:t>White faculties have the most stable tenured proportion – within the 42-48% range.</a:t>
             </a:r>
           </a:p>
           <a:p>
-            <a:pPr lvl="0" indent="0" marL="0">
+            <a:pPr marL="0" lvl="0" indent="0">
               <a:buNone/>
             </a:pPr>
+            <a:endParaRPr/>
           </a:p>
           <a:p>
             <a:pPr lvl="0"/>
             <a:r>
-              <a:rPr/>
               <a:t>Asian faculties experienced two dropped in 2018 and 2020 and only has 31-32% tenured proportion. The tenured proportion increased from 31% to 51% in 2021.</a:t>
             </a:r>
           </a:p>
           <a:p>
-            <a:pPr lvl="0" indent="0" marL="0">
+            <a:pPr marL="0" lvl="0" indent="0">
               <a:buNone/>
             </a:pPr>
+            <a:endParaRPr/>
           </a:p>
           <a:p>
             <a:pPr lvl="0"/>
             <a:r>
-              <a:rPr/>
               <a:t>Smaller racial groups have below 30% tenured proportions before 2018. However, their tenured proportion has been increasing since 2018 and reached 46-48% in 2021.</a:t>
             </a:r>
           </a:p>
           <a:p>
-            <a:pPr lvl="0" indent="0" marL="0">
+            <a:pPr marL="0" lvl="0" indent="0">
               <a:buNone/>
             </a:pPr>
-          </a:p>
-          <a:p>
-            <a:pPr lvl="0" indent="0" marL="0">
+            <a:endParaRPr/>
+          </a:p>
+          <a:p>
+            <a:pPr marL="0" lvl="0" indent="0">
               <a:buNone/>
             </a:pPr>
             <a:r>
-              <a:rPr/>
               <a:t>Omitted details: - 2017 and 2018 are years that most groups experienced drops except Hispanic faculties. International faculties dropped 7% in 2017 and Black faculties dropped 13% in 2018.</a:t>
             </a:r>
             <a:br/>
             <a:r>
-              <a:rPr/>
               <a:t>- Hispanic faculties’ tenured proportion has been increasing from 25% in 2016 to 59% in 2020. However, it dropped to 46% and become close to other groups.</a:t>
             </a:r>
           </a:p>
           <a:p>
-            <a:pPr lvl="0" indent="0" marL="0">
+            <a:pPr marL="0" lvl="0" indent="0">
               <a:buNone/>
             </a:pPr>
+            <a:endParaRPr/>
           </a:p>
           <a:p>
             <a:pPr lvl="0"/>
             <a:r>
-              <a:rPr/>
               <a:t>International faculties have the lowest tenured proportion of 20% in 2016, but the proportion jumped to 50% in 2018 and 2021.</a:t>
             </a:r>
           </a:p>
           <a:p>
-            <a:pPr lvl="0" indent="0" marL="0">
+            <a:pPr marL="0" lvl="0" indent="0">
               <a:buNone/>
             </a:pPr>
+            <a:endParaRPr/>
           </a:p>
           <a:p>
             <a:pPr lvl="0"/>
             <a:r>
-              <a:rPr/>
               <a:t>Hispanic faculties have increased tenured proportion from 33% in 2016 to 59% in 2020, and 55% in 2021, both are the highest among all racial groups in those two years.</a:t>
             </a:r>
           </a:p>
           <a:p>
-            <a:pPr lvl="0" indent="0" marL="0">
+            <a:pPr marL="0" lvl="0" indent="0">
               <a:buNone/>
             </a:pPr>
+            <a:endParaRPr/>
           </a:p>
           <a:p>
             <a:pPr lvl="0"/>
             <a:r>
-              <a:rPr/>
               <a:t>Black faculties’ tenured proportion dropped from 50% in 2017 to 20% in 2018, but has been increasing by 7% each year to 44% in 2020 and kept stable at 45% in 2021.</a:t>
             </a:r>
           </a:p>
@@ -849,6 +848,9 @@
       </p:sp>
     </p:spTree>
   </p:cSld>
+  <p:clrMapOvr>
+    <a:masterClrMapping/>
+  </p:clrMapOvr>
 </p:notes>
 </file>
 
@@ -896,11 +898,10 @@
           <a:bodyPr/>
           <a:lstStyle/>
           <a:p>
-            <a:pPr lvl="0" indent="0" marL="0">
+            <a:pPr marL="0" lvl="0" indent="0">
               <a:buNone/>
             </a:pPr>
             <a:r>
-              <a:rPr/>
               <a:t>Hispanic and White faculties have a consistent gender gap with male faculties have higher tenured proportion than female faculties.</a:t>
             </a:r>
           </a:p>
@@ -931,6 +932,9 @@
       </p:sp>
     </p:spTree>
   </p:cSld>
+  <p:clrMapOvr>
+    <a:masterClrMapping/>
+  </p:clrMapOvr>
 </p:notes>
 </file>
 
@@ -1113,7 +1117,7 @@
           <a:p>
             <a:fld id="{241EB5C9-1307-BA42-ABA2-0BC069CD8E7F}" type="datetimeFigureOut">
               <a:rPr lang="en-US" smtClean="0"/>
-              <a:t>1/2/22</a:t>
+              <a:t>9/8/22</a:t>
             </a:fld>
             <a:endParaRPr lang="en-US"/>
           </a:p>
@@ -1281,7 +1285,7 @@
           <a:p>
             <a:fld id="{241EB5C9-1307-BA42-ABA2-0BC069CD8E7F}" type="datetimeFigureOut">
               <a:rPr lang="en-US" smtClean="0"/>
-              <a:t>1/2/22</a:t>
+              <a:t>9/8/22</a:t>
             </a:fld>
             <a:endParaRPr lang="en-US"/>
           </a:p>
@@ -1459,7 +1463,7 @@
           <a:p>
             <a:fld id="{241EB5C9-1307-BA42-ABA2-0BC069CD8E7F}" type="datetimeFigureOut">
               <a:rPr lang="en-US" smtClean="0"/>
-              <a:t>1/2/22</a:t>
+              <a:t>9/8/22</a:t>
             </a:fld>
             <a:endParaRPr lang="en-US"/>
           </a:p>
@@ -1627,7 +1631,7 @@
           <a:p>
             <a:fld id="{241EB5C9-1307-BA42-ABA2-0BC069CD8E7F}" type="datetimeFigureOut">
               <a:rPr lang="en-US" smtClean="0"/>
-              <a:t>1/2/22</a:t>
+              <a:t>9/8/22</a:t>
             </a:fld>
             <a:endParaRPr lang="en-US"/>
           </a:p>
@@ -1872,7 +1876,7 @@
           <a:p>
             <a:fld id="{241EB5C9-1307-BA42-ABA2-0BC069CD8E7F}" type="datetimeFigureOut">
               <a:rPr lang="en-US" smtClean="0"/>
-              <a:t>1/2/22</a:t>
+              <a:t>9/8/22</a:t>
             </a:fld>
             <a:endParaRPr lang="en-US"/>
           </a:p>
@@ -2157,7 +2161,7 @@
           <a:p>
             <a:fld id="{241EB5C9-1307-BA42-ABA2-0BC069CD8E7F}" type="datetimeFigureOut">
               <a:rPr lang="en-US" smtClean="0"/>
-              <a:t>1/2/22</a:t>
+              <a:t>9/8/22</a:t>
             </a:fld>
             <a:endParaRPr lang="en-US"/>
           </a:p>
@@ -2576,7 +2580,7 @@
           <a:p>
             <a:fld id="{241EB5C9-1307-BA42-ABA2-0BC069CD8E7F}" type="datetimeFigureOut">
               <a:rPr lang="en-US" smtClean="0"/>
-              <a:t>1/2/22</a:t>
+              <a:t>9/8/22</a:t>
             </a:fld>
             <a:endParaRPr lang="en-US"/>
           </a:p>
@@ -2693,7 +2697,7 @@
           <a:p>
             <a:fld id="{241EB5C9-1307-BA42-ABA2-0BC069CD8E7F}" type="datetimeFigureOut">
               <a:rPr lang="en-US" smtClean="0"/>
-              <a:t>1/2/22</a:t>
+              <a:t>9/8/22</a:t>
             </a:fld>
             <a:endParaRPr lang="en-US"/>
           </a:p>
@@ -2788,7 +2792,7 @@
           <a:p>
             <a:fld id="{241EB5C9-1307-BA42-ABA2-0BC069CD8E7F}" type="datetimeFigureOut">
               <a:rPr lang="en-US" smtClean="0"/>
-              <a:t>1/2/22</a:t>
+              <a:t>9/8/22</a:t>
             </a:fld>
             <a:endParaRPr lang="en-US"/>
           </a:p>
@@ -3063,7 +3067,7 @@
           <a:p>
             <a:fld id="{241EB5C9-1307-BA42-ABA2-0BC069CD8E7F}" type="datetimeFigureOut">
               <a:rPr lang="en-US" smtClean="0"/>
-              <a:t>1/2/22</a:t>
+              <a:t>9/8/22</a:t>
             </a:fld>
             <a:endParaRPr lang="en-US"/>
           </a:p>
@@ -3315,7 +3319,7 @@
           <a:p>
             <a:fld id="{241EB5C9-1307-BA42-ABA2-0BC069CD8E7F}" type="datetimeFigureOut">
               <a:rPr lang="en-US" smtClean="0"/>
-              <a:t>1/2/22</a:t>
+              <a:t>9/8/22</a:t>
             </a:fld>
             <a:endParaRPr lang="en-US"/>
           </a:p>
@@ -3377,7 +3381,7 @@
 </file>
 
 <file path=ppt/slideMasters/slideMaster1.xml><?xml version="1.0" encoding="utf-8"?>
-<p:sldMaster xmlns:a="http://schemas.openxmlformats.org/drawingml/2006/main" xmlns:p="http://schemas.openxmlformats.org/presentationml/2006/main" xmlns:r="http://schemas.openxmlformats.org/officeDocument/2006/relationships">
+<p:sldMaster xmlns:a="http://schemas.openxmlformats.org/drawingml/2006/main" xmlns:r="http://schemas.openxmlformats.org/officeDocument/2006/relationships" xmlns:p="http://schemas.openxmlformats.org/presentationml/2006/main">
   <p:cSld>
     <p:bg>
       <p:bgRef idx="1001">
@@ -3418,7 +3422,7 @@
           </a:prstGeom>
         </p:spPr>
         <p:txBody>
-          <a:bodyPr anchor="ctr" bIns="45720" lIns="91440" rIns="91440" rtlCol="0" tIns="45720" vert="horz">
+          <a:bodyPr vert="horz" lIns="91440" tIns="45720" rIns="91440" bIns="45720" rtlCol="0" anchor="ctr">
             <a:normAutofit/>
           </a:bodyPr>
           <a:lstStyle/>
@@ -3437,7 +3441,7 @@
             <a:spLocks noGrp="1"/>
           </p:cNvSpPr>
           <p:nvPr>
-            <p:ph idx="1" type="body"/>
+            <p:ph type="body" idx="1"/>
           </p:nvPr>
         </p:nvSpPr>
         <p:spPr>
@@ -3450,7 +3454,7 @@
           </a:prstGeom>
         </p:spPr>
         <p:txBody>
-          <a:bodyPr bIns="45720" lIns="91440" rIns="91440" rtlCol="0" tIns="45720" vert="horz">
+          <a:bodyPr vert="horz" lIns="91440" tIns="45720" rIns="91440" bIns="45720" rtlCol="0">
             <a:normAutofit/>
           </a:bodyPr>
           <a:lstStyle/>
@@ -3498,7 +3502,7 @@
             <a:spLocks noGrp="1"/>
           </p:cNvSpPr>
           <p:nvPr>
-            <p:ph idx="2" sz="half" type="dt"/>
+            <p:ph type="dt" sz="half" idx="2"/>
           </p:nvPr>
         </p:nvSpPr>
         <p:spPr>
@@ -3511,7 +3515,7 @@
           </a:prstGeom>
         </p:spPr>
         <p:txBody>
-          <a:bodyPr anchor="ctr" bIns="45720" lIns="91440" rIns="91440" rtlCol="0" tIns="45720" vert="horz"/>
+          <a:bodyPr vert="horz" lIns="91440" tIns="45720" rIns="91440" bIns="45720" rtlCol="0" anchor="ctr"/>
           <a:lstStyle>
             <a:lvl1pPr algn="l">
               <a:defRPr sz="900">
@@ -3526,7 +3530,7 @@
           <a:p>
             <a:fld id="{241EB5C9-1307-BA42-ABA2-0BC069CD8E7F}" type="datetimeFigureOut">
               <a:rPr lang="en-US" smtClean="0"/>
-              <a:t>1/2/22</a:t>
+              <a:t>9/8/22</a:t>
             </a:fld>
             <a:endParaRPr lang="en-US"/>
           </a:p>
@@ -3539,7 +3543,7 @@
             <a:spLocks noGrp="1"/>
           </p:cNvSpPr>
           <p:nvPr>
-            <p:ph idx="3" sz="quarter" type="ftr"/>
+            <p:ph type="ftr" sz="quarter" idx="3"/>
           </p:nvPr>
         </p:nvSpPr>
         <p:spPr>
@@ -3552,7 +3556,7 @@
           </a:prstGeom>
         </p:spPr>
         <p:txBody>
-          <a:bodyPr anchor="ctr" bIns="45720" lIns="91440" rIns="91440" rtlCol="0" tIns="45720" vert="horz"/>
+          <a:bodyPr vert="horz" lIns="91440" tIns="45720" rIns="91440" bIns="45720" rtlCol="0" anchor="ctr"/>
           <a:lstStyle>
             <a:lvl1pPr algn="ctr">
               <a:defRPr sz="900">
@@ -3576,7 +3580,7 @@
             <a:spLocks noGrp="1"/>
           </p:cNvSpPr>
           <p:nvPr>
-            <p:ph idx="4" sz="quarter" type="sldNum"/>
+            <p:ph type="sldNum" sz="quarter" idx="4"/>
           </p:nvPr>
         </p:nvSpPr>
         <p:spPr>
@@ -3589,7 +3593,7 @@
           </a:prstGeom>
         </p:spPr>
         <p:txBody>
-          <a:bodyPr anchor="ctr" bIns="45720" lIns="91440" rIns="91440" rtlCol="0" tIns="45720" vert="horz"/>
+          <a:bodyPr vert="horz" lIns="91440" tIns="45720" rIns="91440" bIns="45720" rtlCol="0" anchor="ctr"/>
           <a:lstStyle>
             <a:lvl1pPr algn="r">
               <a:defRPr sz="900">
@@ -3617,7 +3621,7 @@
       </p:ext>
     </p:extLst>
   </p:cSld>
-  <p:clrMap accent1="accent1" accent2="accent2" accent3="accent3" accent4="accent4" accent5="accent5" accent6="accent6" bg1="lt1" bg2="lt2" folHlink="folHlink" hlink="hlink" tx1="dk1" tx2="dk2"/>
+  <p:clrMap bg1="lt1" tx1="dk1" bg2="lt2" tx2="dk2" accent1="accent1" accent2="accent2" accent3="accent3" accent4="accent4" accent5="accent5" accent6="accent6" hlink="hlink" folHlink="folHlink"/>
   <p:sldLayoutIdLst>
     <p:sldLayoutId id="2147483649" r:id="rId1"/>
     <p:sldLayoutId id="2147483650" r:id="rId2"/>
@@ -3633,12 +3637,12 @@
   </p:sldLayoutIdLst>
   <p:txStyles>
     <p:titleStyle>
-      <a:lvl1pPr algn="ctr" defTabSz="342900" eaLnBrk="1" hangingPunct="1" latinLnBrk="0" rtl="0">
+      <a:lvl1pPr algn="ctr" defTabSz="342900" rtl="0" eaLnBrk="1" latinLnBrk="0" hangingPunct="1">
         <a:spcBef>
           <a:spcPct val="0"/>
         </a:spcBef>
         <a:buNone/>
-        <a:defRPr kern="1200" sz="3300">
+        <a:defRPr sz="3300" kern="1200">
           <a:solidFill>
             <a:schemeClr val="tx1"/>
           </a:solidFill>
@@ -3649,13 +3653,13 @@
       </a:lvl1pPr>
     </p:titleStyle>
     <p:bodyStyle>
-      <a:lvl1pPr algn="l" defTabSz="342900" eaLnBrk="1" hangingPunct="1" indent="-342900" latinLnBrk="0" marL="342900" rtl="0">
+      <a:lvl1pPr marL="342900" indent="-342900" algn="l" defTabSz="342900" rtl="0" eaLnBrk="1" latinLnBrk="0" hangingPunct="1">
         <a:spcBef>
           <a:spcPct val="20000"/>
         </a:spcBef>
         <a:buFont typeface="Arial"/>
         <a:buChar char="•"/>
-        <a:defRPr kern="1200" sz="2400">
+        <a:defRPr sz="2400" kern="1200">
           <a:solidFill>
             <a:schemeClr val="tx1"/>
           </a:solidFill>
@@ -3664,13 +3668,13 @@
           <a:cs typeface="+mn-cs"/>
         </a:defRPr>
       </a:lvl1pPr>
-      <a:lvl2pPr algn="l" defTabSz="342900" eaLnBrk="1" hangingPunct="1" indent="-342900" latinLnBrk="0" marL="685800" rtl="0">
+      <a:lvl2pPr marL="685800" indent="-342900" algn="l" defTabSz="342900" rtl="0" eaLnBrk="1" latinLnBrk="0" hangingPunct="1">
         <a:spcBef>
           <a:spcPct val="20000"/>
         </a:spcBef>
         <a:buFont typeface="Arial"/>
         <a:buChar char="–"/>
-        <a:defRPr kern="1200" sz="2100">
+        <a:defRPr sz="2100" kern="1200">
           <a:solidFill>
             <a:schemeClr val="tx1"/>
           </a:solidFill>
@@ -3679,13 +3683,13 @@
           <a:cs typeface="+mn-cs"/>
         </a:defRPr>
       </a:lvl2pPr>
-      <a:lvl3pPr algn="l" defTabSz="342900" eaLnBrk="1" hangingPunct="1" indent="-342900" latinLnBrk="0" marL="1028700" rtl="0">
+      <a:lvl3pPr marL="1028700" indent="-342900" algn="l" defTabSz="342900" rtl="0" eaLnBrk="1" latinLnBrk="0" hangingPunct="1">
         <a:spcBef>
           <a:spcPct val="20000"/>
         </a:spcBef>
         <a:buFont typeface="Arial"/>
         <a:buChar char="•"/>
-        <a:defRPr kern="1200" sz="1800">
+        <a:defRPr sz="1800" kern="1200">
           <a:solidFill>
             <a:schemeClr val="tx1"/>
           </a:solidFill>
@@ -3694,13 +3698,13 @@
           <a:cs typeface="+mn-cs"/>
         </a:defRPr>
       </a:lvl3pPr>
-      <a:lvl4pPr algn="l" defTabSz="342900" eaLnBrk="1" hangingPunct="1" indent="-342900" latinLnBrk="0" marL="1371600" rtl="0">
+      <a:lvl4pPr marL="1371600" indent="-342900" algn="l" defTabSz="342900" rtl="0" eaLnBrk="1" latinLnBrk="0" hangingPunct="1">
         <a:spcBef>
           <a:spcPct val="20000"/>
         </a:spcBef>
         <a:buFont typeface="Arial"/>
         <a:buChar char="–"/>
-        <a:defRPr kern="1200" sz="1500">
+        <a:defRPr sz="1500" kern="1200">
           <a:solidFill>
             <a:schemeClr val="tx1"/>
           </a:solidFill>
@@ -3709,13 +3713,13 @@
           <a:cs typeface="+mn-cs"/>
         </a:defRPr>
       </a:lvl4pPr>
-      <a:lvl5pPr algn="l" defTabSz="342900" eaLnBrk="1" hangingPunct="1" indent="-342900" latinLnBrk="0" marL="1714500" rtl="0">
+      <a:lvl5pPr marL="1714500" indent="-342900" algn="l" defTabSz="342900" rtl="0" eaLnBrk="1" latinLnBrk="0" hangingPunct="1">
         <a:spcBef>
           <a:spcPct val="20000"/>
         </a:spcBef>
         <a:buFont typeface="Arial"/>
         <a:buChar char="»"/>
-        <a:defRPr kern="1200" sz="1500">
+        <a:defRPr sz="1500" kern="1200">
           <a:solidFill>
             <a:schemeClr val="tx1"/>
           </a:solidFill>
@@ -3724,13 +3728,13 @@
           <a:cs typeface="+mn-cs"/>
         </a:defRPr>
       </a:lvl5pPr>
-      <a:lvl6pPr algn="l" defTabSz="342900" eaLnBrk="1" hangingPunct="1" indent="-342900" latinLnBrk="0" marL="2057400" rtl="0">
+      <a:lvl6pPr marL="2057400" indent="-342900" algn="l" defTabSz="342900" rtl="0" eaLnBrk="1" latinLnBrk="0" hangingPunct="1">
         <a:spcBef>
           <a:spcPct val="20000"/>
         </a:spcBef>
         <a:buFont typeface="Arial"/>
         <a:buChar char="•"/>
-        <a:defRPr kern="1200" sz="1500">
+        <a:defRPr sz="1500" kern="1200">
           <a:solidFill>
             <a:schemeClr val="tx1"/>
           </a:solidFill>
@@ -3739,13 +3743,13 @@
           <a:cs typeface="+mn-cs"/>
         </a:defRPr>
       </a:lvl6pPr>
-      <a:lvl7pPr algn="l" defTabSz="342900" eaLnBrk="1" hangingPunct="1" indent="-342900" latinLnBrk="0" marL="2400300" rtl="0">
+      <a:lvl7pPr marL="2400300" indent="-342900" algn="l" defTabSz="342900" rtl="0" eaLnBrk="1" latinLnBrk="0" hangingPunct="1">
         <a:spcBef>
           <a:spcPct val="20000"/>
         </a:spcBef>
         <a:buFont typeface="Arial"/>
         <a:buChar char="•"/>
-        <a:defRPr kern="1200" sz="1500">
+        <a:defRPr sz="1500" kern="1200">
           <a:solidFill>
             <a:schemeClr val="tx1"/>
           </a:solidFill>
@@ -3754,13 +3758,13 @@
           <a:cs typeface="+mn-cs"/>
         </a:defRPr>
       </a:lvl7pPr>
-      <a:lvl8pPr algn="l" defTabSz="342900" eaLnBrk="1" hangingPunct="1" indent="-342900" latinLnBrk="0" marL="2743200" rtl="0">
+      <a:lvl8pPr marL="2743200" indent="-342900" algn="l" defTabSz="342900" rtl="0" eaLnBrk="1" latinLnBrk="0" hangingPunct="1">
         <a:spcBef>
           <a:spcPct val="20000"/>
         </a:spcBef>
         <a:buFont typeface="Arial"/>
         <a:buChar char="•"/>
-        <a:defRPr kern="1200" sz="1500">
+        <a:defRPr sz="1500" kern="1200">
           <a:solidFill>
             <a:schemeClr val="tx1"/>
           </a:solidFill>
@@ -3769,13 +3773,13 @@
           <a:cs typeface="+mn-cs"/>
         </a:defRPr>
       </a:lvl8pPr>
-      <a:lvl9pPr algn="l" defTabSz="342900" eaLnBrk="1" hangingPunct="1" indent="-342900" latinLnBrk="0" marL="3086100" rtl="0">
+      <a:lvl9pPr marL="3086100" indent="-342900" algn="l" defTabSz="342900" rtl="0" eaLnBrk="1" latinLnBrk="0" hangingPunct="1">
         <a:spcBef>
           <a:spcPct val="20000"/>
         </a:spcBef>
         <a:buFont typeface="Arial"/>
         <a:buChar char="•"/>
-        <a:defRPr kern="1200" sz="1500">
+        <a:defRPr sz="1500" kern="1200">
           <a:solidFill>
             <a:schemeClr val="tx1"/>
           </a:solidFill>
@@ -3789,8 +3793,8 @@
       <a:defPPr>
         <a:defRPr lang="en-US"/>
       </a:defPPr>
-      <a:lvl1pPr algn="l" defTabSz="342900" eaLnBrk="1" hangingPunct="1" latinLnBrk="0" marL="0" rtl="0">
-        <a:defRPr kern="1200" sz="1350">
+      <a:lvl1pPr marL="0" algn="l" defTabSz="342900" rtl="0" eaLnBrk="1" latinLnBrk="0" hangingPunct="1">
+        <a:defRPr sz="1350" kern="1200">
           <a:solidFill>
             <a:schemeClr val="tx1"/>
           </a:solidFill>
@@ -3799,8 +3803,8 @@
           <a:cs typeface="+mn-cs"/>
         </a:defRPr>
       </a:lvl1pPr>
-      <a:lvl2pPr algn="l" defTabSz="342900" eaLnBrk="1" hangingPunct="1" latinLnBrk="0" marL="342900" rtl="0">
-        <a:defRPr kern="1200" sz="1350">
+      <a:lvl2pPr marL="342900" algn="l" defTabSz="342900" rtl="0" eaLnBrk="1" latinLnBrk="0" hangingPunct="1">
+        <a:defRPr sz="1350" kern="1200">
           <a:solidFill>
             <a:schemeClr val="tx1"/>
           </a:solidFill>
@@ -3809,8 +3813,8 @@
           <a:cs typeface="+mn-cs"/>
         </a:defRPr>
       </a:lvl2pPr>
-      <a:lvl3pPr algn="l" defTabSz="342900" eaLnBrk="1" hangingPunct="1" latinLnBrk="0" marL="685800" rtl="0">
-        <a:defRPr kern="1200" sz="1350">
+      <a:lvl3pPr marL="685800" algn="l" defTabSz="342900" rtl="0" eaLnBrk="1" latinLnBrk="0" hangingPunct="1">
+        <a:defRPr sz="1350" kern="1200">
           <a:solidFill>
             <a:schemeClr val="tx1"/>
           </a:solidFill>
@@ -3819,8 +3823,8 @@
           <a:cs typeface="+mn-cs"/>
         </a:defRPr>
       </a:lvl3pPr>
-      <a:lvl4pPr algn="l" defTabSz="342900" eaLnBrk="1" hangingPunct="1" latinLnBrk="0" marL="1028700" rtl="0">
-        <a:defRPr kern="1200" sz="1350">
+      <a:lvl4pPr marL="1028700" algn="l" defTabSz="342900" rtl="0" eaLnBrk="1" latinLnBrk="0" hangingPunct="1">
+        <a:defRPr sz="1350" kern="1200">
           <a:solidFill>
             <a:schemeClr val="tx1"/>
           </a:solidFill>
@@ -3829,8 +3833,8 @@
           <a:cs typeface="+mn-cs"/>
         </a:defRPr>
       </a:lvl4pPr>
-      <a:lvl5pPr algn="l" defTabSz="342900" eaLnBrk="1" hangingPunct="1" latinLnBrk="0" marL="1371600" rtl="0">
-        <a:defRPr kern="1200" sz="1350">
+      <a:lvl5pPr marL="1371600" algn="l" defTabSz="342900" rtl="0" eaLnBrk="1" latinLnBrk="0" hangingPunct="1">
+        <a:defRPr sz="1350" kern="1200">
           <a:solidFill>
             <a:schemeClr val="tx1"/>
           </a:solidFill>
@@ -3839,8 +3843,8 @@
           <a:cs typeface="+mn-cs"/>
         </a:defRPr>
       </a:lvl5pPr>
-      <a:lvl6pPr algn="l" defTabSz="342900" eaLnBrk="1" hangingPunct="1" latinLnBrk="0" marL="1714500" rtl="0">
-        <a:defRPr kern="1200" sz="1350">
+      <a:lvl6pPr marL="1714500" algn="l" defTabSz="342900" rtl="0" eaLnBrk="1" latinLnBrk="0" hangingPunct="1">
+        <a:defRPr sz="1350" kern="1200">
           <a:solidFill>
             <a:schemeClr val="tx1"/>
           </a:solidFill>
@@ -3849,8 +3853,8 @@
           <a:cs typeface="+mn-cs"/>
         </a:defRPr>
       </a:lvl6pPr>
-      <a:lvl7pPr algn="l" defTabSz="342900" eaLnBrk="1" hangingPunct="1" latinLnBrk="0" marL="2057400" rtl="0">
-        <a:defRPr kern="1200" sz="1350">
+      <a:lvl7pPr marL="2057400" algn="l" defTabSz="342900" rtl="0" eaLnBrk="1" latinLnBrk="0" hangingPunct="1">
+        <a:defRPr sz="1350" kern="1200">
           <a:solidFill>
             <a:schemeClr val="tx1"/>
           </a:solidFill>
@@ -3859,8 +3863,8 @@
           <a:cs typeface="+mn-cs"/>
         </a:defRPr>
       </a:lvl7pPr>
-      <a:lvl8pPr algn="l" defTabSz="342900" eaLnBrk="1" hangingPunct="1" latinLnBrk="0" marL="2400300" rtl="0">
-        <a:defRPr kern="1200" sz="1350">
+      <a:lvl8pPr marL="2400300" algn="l" defTabSz="342900" rtl="0" eaLnBrk="1" latinLnBrk="0" hangingPunct="1">
+        <a:defRPr sz="1350" kern="1200">
           <a:solidFill>
             <a:schemeClr val="tx1"/>
           </a:solidFill>
@@ -3869,8 +3873,8 @@
           <a:cs typeface="+mn-cs"/>
         </a:defRPr>
       </a:lvl8pPr>
-      <a:lvl9pPr algn="l" defTabSz="342900" eaLnBrk="1" hangingPunct="1" latinLnBrk="0" marL="2743200" rtl="0">
-        <a:defRPr kern="1200" sz="1350">
+      <a:lvl9pPr marL="2743200" algn="l" defTabSz="342900" rtl="0" eaLnBrk="1" latinLnBrk="0" hangingPunct="1">
+        <a:defRPr sz="1350" kern="1200">
           <a:solidFill>
             <a:schemeClr val="tx1"/>
           </a:solidFill>
@@ -3921,11 +3925,10 @@
           <a:bodyPr/>
           <a:lstStyle/>
           <a:p>
-            <a:pPr lvl="0" indent="0" marL="0">
+            <a:pPr marL="0" lvl="0" indent="0">
               <a:buNone/>
             </a:pPr>
             <a:r>
-              <a:rPr/>
               <a:t>FacultyTenureAnalysis</a:t>
             </a:r>
           </a:p>
@@ -3938,7 +3941,7 @@
             <a:spLocks noGrp="1"/>
           </p:cNvSpPr>
           <p:nvPr>
-            <p:ph idx="1" type="subTitle"/>
+            <p:ph type="subTitle" idx="1"/>
           </p:nvPr>
         </p:nvSpPr>
         <p:spPr>
@@ -3951,13 +3954,12 @@
           <a:bodyPr/>
           <a:lstStyle/>
           <a:p>
-            <a:pPr lvl="0" indent="0" marL="0">
+            <a:pPr marL="0" lvl="0" indent="0">
               <a:buNone/>
             </a:pPr>
             <a:br/>
             <a:br/>
             <a:r>
-              <a:rPr/>
               <a:t>Linli Zhou</a:t>
             </a:r>
           </a:p>
@@ -3965,110 +3967,9 @@
       </p:sp>
     </p:spTree>
   </p:cSld>
-</p:sld>
-</file>
-
-<file path=ppt/slides/slide10.xml><?xml version="1.0" encoding="utf-8"?>
-<p:sld xmlns:a="http://schemas.openxmlformats.org/drawingml/2006/main" xmlns:r="http://schemas.openxmlformats.org/officeDocument/2006/relationships" xmlns:p="http://schemas.openxmlformats.org/presentationml/2006/main">
-  <p:cSld>
-    <p:spTree>
-      <p:nvGrpSpPr>
-        <p:cNvPr id="1" name=""/>
-        <p:cNvGrpSpPr/>
-        <p:nvPr/>
-      </p:nvGrpSpPr>
-      <p:grpSpPr>
-        <a:xfrm>
-          <a:off x="0" y="0"/>
-          <a:ext cx="0" cy="0"/>
-          <a:chOff x="0" y="0"/>
-          <a:chExt cx="0" cy="0"/>
-        </a:xfrm>
-      </p:grpSpPr>
-      <p:pic>
-        <p:nvPicPr>
-          <p:cNvPr descr="FacultyTenureAnalysis_files/figure-pptx/unnamed-chunk-3-1.png" id="0" name="Picture 1"/>
-          <p:cNvPicPr>
-            <a:picLocks noGrp="1" noChangeAspect="1"/>
-          </p:cNvPicPr>
-          <p:nvPr/>
-        </p:nvPicPr>
-        <p:blipFill>
-          <a:blip r:embed="rId2"/>
-          <a:stretch>
-            <a:fillRect/>
-          </a:stretch>
-        </p:blipFill>
-        <p:spPr bwMode="auto">
-          <a:xfrm>
-            <a:off x="1181100" y="1193800"/>
-            <a:ext cx="6781800" cy="3390900"/>
-          </a:xfrm>
-          <a:prstGeom prst="rect">
-            <a:avLst/>
-          </a:prstGeom>
-          <a:noFill/>
-          <a:ln w="9525">
-            <a:noFill/>
-            <a:headEnd/>
-            <a:tailEnd/>
-          </a:ln>
-        </p:spPr>
-      </p:pic>
-    </p:spTree>
-  </p:cSld>
-</p:sld>
-</file>
-
-<file path=ppt/slides/slide11.xml><?xml version="1.0" encoding="utf-8"?>
-<p:sld xmlns:a="http://schemas.openxmlformats.org/drawingml/2006/main" xmlns:r="http://schemas.openxmlformats.org/officeDocument/2006/relationships" xmlns:p="http://schemas.openxmlformats.org/presentationml/2006/main">
-  <p:cSld>
-    <p:spTree>
-      <p:nvGrpSpPr>
-        <p:cNvPr id="1" name=""/>
-        <p:cNvGrpSpPr/>
-        <p:nvPr/>
-      </p:nvGrpSpPr>
-      <p:grpSpPr>
-        <a:xfrm>
-          <a:off x="0" y="0"/>
-          <a:ext cx="0" cy="0"/>
-          <a:chOff x="0" y="0"/>
-          <a:chExt cx="0" cy="0"/>
-        </a:xfrm>
-      </p:grpSpPr>
-      <p:pic>
-        <p:nvPicPr>
-          <p:cNvPr descr="FacultyTenureAnalysis_files/figure-pptx/unnamed-chunk-4-1.png" id="0" name="Picture 1"/>
-          <p:cNvPicPr>
-            <a:picLocks noGrp="1" noChangeAspect="1"/>
-          </p:cNvPicPr>
-          <p:nvPr/>
-        </p:nvPicPr>
-        <p:blipFill>
-          <a:blip r:embed="rId2"/>
-          <a:stretch>
-            <a:fillRect/>
-          </a:stretch>
-        </p:blipFill>
-        <p:spPr bwMode="auto">
-          <a:xfrm>
-            <a:off x="1181100" y="1193800"/>
-            <a:ext cx="6781800" cy="3390900"/>
-          </a:xfrm>
-          <a:prstGeom prst="rect">
-            <a:avLst/>
-          </a:prstGeom>
-          <a:noFill/>
-          <a:ln w="9525">
-            <a:noFill/>
-            <a:headEnd/>
-            <a:tailEnd/>
-          </a:ln>
-        </p:spPr>
-      </p:pic>
-    </p:spTree>
-  </p:cSld>
+  <p:clrMapOvr>
+    <a:masterClrMapping/>
+  </p:clrMapOvr>
 </p:sld>
 </file>
 
@@ -4104,11 +4005,10 @@
           <a:bodyPr/>
           <a:lstStyle/>
           <a:p>
-            <a:pPr lvl="0" indent="0" marL="0">
+            <a:pPr marL="0" lvl="0" indent="0">
               <a:buNone/>
             </a:pPr>
             <a:r>
-              <a:rPr/>
               <a:t>Research Questions</a:t>
             </a:r>
           </a:p>
@@ -4129,11 +4029,10 @@
           <a:bodyPr/>
           <a:lstStyle/>
           <a:p>
-            <a:pPr lvl="0" indent="-342900" marL="342900">
+            <a:pPr marL="342900" lvl="0" indent="-342900">
               <a:buAutoNum type="arabicPeriod"/>
             </a:pPr>
             <a:r>
-              <a:rPr/>
               <a:t>How has the proportion of tenure-line (TL) and non-tenure-line (NTL) faculty </a:t>
             </a:r>
             <a:r>
@@ -4141,16 +4040,14 @@
               <a:t>changed over time</a:t>
             </a:r>
             <a:r>
-              <a:rPr/>
               <a:t>?</a:t>
             </a:r>
           </a:p>
           <a:p>
-            <a:pPr lvl="0" indent="-342900" marL="342900">
+            <a:pPr marL="342900" lvl="0" indent="-342900">
               <a:buAutoNum type="arabicPeriod"/>
             </a:pPr>
             <a:r>
-              <a:rPr/>
               <a:t>How has the proportion of TL faculty in certain </a:t>
             </a:r>
             <a:r>
@@ -4158,16 +4055,14 @@
               <a:t>rank, racial, or sex</a:t>
             </a:r>
             <a:r>
-              <a:rPr/>
               <a:t> groups changed over time?</a:t>
             </a:r>
           </a:p>
           <a:p>
-            <a:pPr lvl="0" indent="-342900" marL="342900">
+            <a:pPr marL="342900" lvl="0" indent="-342900">
               <a:buAutoNum type="arabicPeriod"/>
             </a:pPr>
             <a:r>
-              <a:rPr/>
               <a:t>How has the proportion of TL and NTL faculty changed over time for different </a:t>
             </a:r>
             <a:r>
@@ -4175,7 +4070,6 @@
               <a:t>departments</a:t>
             </a:r>
             <a:r>
-              <a:rPr/>
               <a:t>?</a:t>
             </a:r>
           </a:p>
@@ -4183,6 +4077,9 @@
       </p:sp>
     </p:spTree>
   </p:cSld>
+  <p:clrMapOvr>
+    <a:masterClrMapping/>
+  </p:clrMapOvr>
 </p:sld>
 </file>
 
@@ -4218,19 +4115,19 @@
           <a:bodyPr/>
           <a:lstStyle/>
           <a:p>
-            <a:pPr lvl="0" indent="0" marL="0">
+            <a:pPr marL="0" lvl="0" indent="0">
               <a:buNone/>
             </a:pPr>
             <a:r>
-              <a:rPr/>
-              <a:t>Historical Trends</a:t>
+              <a:rPr dirty="0"/>
+              <a:t>Trends</a:t>
             </a:r>
           </a:p>
         </p:txBody>
       </p:sp>
       <p:pic>
         <p:nvPicPr>
-          <p:cNvPr descr="FacultyTenureAnalysis_files/figure-pptx/unique%20TvsN%20across%20year-1.png" id="0" name="Picture 1"/>
+          <p:cNvPr id="3" name="Picture 1" descr="FacultyTenureAnalysis_files/figure-pptx/unique%20TvsN%20across%20year-1.png"/>
           <p:cNvPicPr>
             <a:picLocks noGrp="1" noChangeAspect="1"/>
           </p:cNvPicPr>
@@ -4260,6 +4157,9 @@
       </p:pic>
     </p:spTree>
   </p:cSld>
+  <p:clrMapOvr>
+    <a:masterClrMapping/>
+  </p:clrMapOvr>
 </p:sld>
 </file>
 
@@ -4295,19 +4195,19 @@
           <a:bodyPr/>
           <a:lstStyle/>
           <a:p>
-            <a:pPr lvl="0" indent="0" marL="0">
+            <a:pPr marL="0" lvl="0" indent="0">
               <a:buNone/>
             </a:pPr>
             <a:r>
-              <a:rPr/>
-              <a:t>Historical Trends Breakdown: Faculty Rank</a:t>
+              <a:rPr dirty="0"/>
+              <a:t>Trends Breakdown: Faculty Rank</a:t>
             </a:r>
           </a:p>
         </p:txBody>
       </p:sp>
       <p:pic>
         <p:nvPicPr>
-          <p:cNvPr descr="FacultyTenureAnalysis_files/figure-pptx/tenured%20trend%20by%20rank-1.png" id="0" name="Picture 1"/>
+          <p:cNvPr id="3" name="Picture 1" descr="FacultyTenureAnalysis_files/figure-pptx/tenured%20trend%20by%20rank-1.png"/>
           <p:cNvPicPr>
             <a:picLocks noGrp="1" noChangeAspect="1"/>
           </p:cNvPicPr>
@@ -4337,6 +4237,9 @@
       </p:pic>
     </p:spTree>
   </p:cSld>
+  <p:clrMapOvr>
+    <a:masterClrMapping/>
+  </p:clrMapOvr>
 </p:sld>
 </file>
 
@@ -4372,19 +4275,19 @@
           <a:bodyPr/>
           <a:lstStyle/>
           <a:p>
-            <a:pPr lvl="0" indent="0" marL="0">
+            <a:pPr marL="0" lvl="0" indent="0">
               <a:buNone/>
             </a:pPr>
             <a:r>
-              <a:rPr/>
-              <a:t>Historical Trends Breakdown: Race</a:t>
+              <a:rPr dirty="0"/>
+              <a:t>Trends Breakdown: Race</a:t>
             </a:r>
           </a:p>
         </p:txBody>
       </p:sp>
       <p:pic>
         <p:nvPicPr>
-          <p:cNvPr descr="FacultyTenureAnalysis_files/figure-pptx/facet%20two%20race%20bulk%20group-1.png" id="0" name="Picture 1"/>
+          <p:cNvPr id="3" name="Picture 1" descr="FacultyTenureAnalysis_files/figure-pptx/facet%20two%20race%20bulk%20group-1.png"/>
           <p:cNvPicPr>
             <a:picLocks noGrp="1" noChangeAspect="1"/>
           </p:cNvPicPr>
@@ -4414,6 +4317,9 @@
       </p:pic>
     </p:spTree>
   </p:cSld>
+  <p:clrMapOvr>
+    <a:masterClrMapping/>
+  </p:clrMapOvr>
 </p:sld>
 </file>
 
@@ -4446,22 +4352,36 @@
         </p:nvSpPr>
         <p:spPr/>
         <p:txBody>
-          <a:bodyPr/>
-          <a:lstStyle/>
-          <a:p>
-            <a:pPr lvl="0" indent="0" marL="0">
+          <a:bodyPr>
+            <a:normAutofit/>
+          </a:bodyPr>
+          <a:lstStyle/>
+          <a:p>
+            <a:pPr marL="0" lvl="0" indent="0">
               <a:buNone/>
             </a:pPr>
             <a:r>
-              <a:rPr/>
-              <a:t>Historical Trends Breakdown: Legal Sex in Different Race</a:t>
+              <a:rPr lang="en-US" dirty="0"/>
+              <a:t>Trends Breakdown: </a:t>
+            </a:r>
+            <a:r>
+              <a:rPr dirty="0"/>
+              <a:t>Legal Sex </a:t>
+            </a:r>
+            <a:r>
+              <a:rPr lang="en-US" dirty="0"/>
+              <a:t>&amp; </a:t>
+            </a:r>
+            <a:r>
+              <a:rPr dirty="0"/>
+              <a:t>Race</a:t>
             </a:r>
           </a:p>
         </p:txBody>
       </p:sp>
       <p:pic>
         <p:nvPicPr>
-          <p:cNvPr descr="FacultyTenureAnalysis_files/figure-pptx/tenured%20trend%20by%20sex%20in%20different%20race-1.png" id="0" name="Picture 1"/>
+          <p:cNvPr id="3" name="Picture 1" descr="FacultyTenureAnalysis_files/figure-pptx/tenured%20trend%20by%20sex%20in%20different%20race-1.png"/>
           <p:cNvPicPr>
             <a:picLocks noGrp="1" noChangeAspect="1"/>
           </p:cNvPicPr>
@@ -4491,6 +4411,9 @@
       </p:pic>
     </p:spTree>
   </p:cSld>
+  <p:clrMapOvr>
+    <a:masterClrMapping/>
+  </p:clrMapOvr>
 </p:sld>
 </file>
 
@@ -4523,24 +4446,31 @@
         </p:nvSpPr>
         <p:spPr/>
         <p:txBody>
-          <a:bodyPr/>
-          <a:lstStyle/>
-          <a:p>
-            <a:pPr lvl="0" indent="0" marL="0">
+          <a:bodyPr>
+            <a:normAutofit fontScale="90000"/>
+          </a:bodyPr>
+          <a:lstStyle/>
+          <a:p>
+            <a:pPr marL="0" lvl="0" indent="0">
               <a:buNone/>
             </a:pPr>
             <a:r>
-              <a:rPr/>
-              <a:t>Departmental Tenure Status</a:t>
+              <a:t>Departments with Significant Changes (2016~2021)</a:t>
             </a:r>
           </a:p>
         </p:txBody>
       </p:sp>
       <p:pic>
         <p:nvPicPr>
-          <p:cNvPr descr="FacultyTenureAnalysis_files/figure-pptx/function%20trend.dep-1.png" id="0" name="Picture 1"/>
+          <p:cNvPr id="6" name="Picture 5">
+            <a:extLst>
+              <a:ext uri="{FF2B5EF4-FFF2-40B4-BE49-F238E27FC236}">
+                <a16:creationId xmlns:a16="http://schemas.microsoft.com/office/drawing/2014/main" id="{6BF25A85-1DE3-3936-15D1-C0DEB12F300D}"/>
+              </a:ext>
+            </a:extLst>
+          </p:cNvPr>
           <p:cNvPicPr>
-            <a:picLocks noGrp="1" noChangeAspect="1"/>
+            <a:picLocks noChangeAspect="1"/>
           </p:cNvPicPr>
           <p:nvPr/>
         </p:nvPicPr>
@@ -4550,24 +4480,100 @@
             <a:fillRect/>
           </a:stretch>
         </p:blipFill>
-        <p:spPr bwMode="auto">
+        <p:spPr>
           <a:xfrm>
-            <a:off x="1181100" y="1193800"/>
-            <a:ext cx="6781800" cy="3390900"/>
+            <a:off x="1678176" y="834195"/>
+            <a:ext cx="5787648" cy="3880680"/>
           </a:xfrm>
           <a:prstGeom prst="rect">
             <a:avLst/>
           </a:prstGeom>
-          <a:noFill/>
-          <a:ln w="9525">
-            <a:noFill/>
-            <a:headEnd/>
-            <a:tailEnd/>
-          </a:ln>
         </p:spPr>
       </p:pic>
+      <p:sp>
+        <p:nvSpPr>
+          <p:cNvPr id="7" name="Title 1">
+            <a:extLst>
+              <a:ext uri="{FF2B5EF4-FFF2-40B4-BE49-F238E27FC236}">
+                <a16:creationId xmlns:a16="http://schemas.microsoft.com/office/drawing/2014/main" id="{70732909-1EA4-B757-CBD1-3F046B7AB124}"/>
+              </a:ext>
+            </a:extLst>
+          </p:cNvPr>
+          <p:cNvSpPr txBox="1">
+            <a:spLocks/>
+          </p:cNvSpPr>
+          <p:nvPr/>
+        </p:nvSpPr>
+        <p:spPr>
+          <a:xfrm>
+            <a:off x="764081" y="4714875"/>
+            <a:ext cx="7278848" cy="428625"/>
+          </a:xfrm>
+          <a:prstGeom prst="rect">
+            <a:avLst/>
+          </a:prstGeom>
+        </p:spPr>
+        <p:txBody>
+          <a:bodyPr vert="horz" lIns="91440" tIns="45720" rIns="91440" bIns="45720" rtlCol="0" anchor="ctr">
+            <a:normAutofit fontScale="97500"/>
+          </a:bodyPr>
+          <a:lstStyle>
+            <a:lvl1pPr algn="ctr" defTabSz="342900" rtl="0" eaLnBrk="1" latinLnBrk="0" hangingPunct="1">
+              <a:spcBef>
+                <a:spcPct val="0"/>
+              </a:spcBef>
+              <a:buNone/>
+              <a:defRPr sz="3300" kern="1200">
+                <a:solidFill>
+                  <a:schemeClr val="tx1"/>
+                </a:solidFill>
+                <a:latin typeface="+mj-lt"/>
+                <a:ea typeface="+mj-ea"/>
+                <a:cs typeface="+mj-cs"/>
+              </a:defRPr>
+            </a:lvl1pPr>
+          </a:lstStyle>
+          <a:p>
+            <a:r>
+              <a:rPr lang="en-US" sz="1400" dirty="0">
+                <a:latin typeface="+mn-lt"/>
+              </a:rPr>
+              <a:t>Note: An </a:t>
+            </a:r>
+            <a:r>
+              <a:rPr lang="en-US" sz="1400" dirty="0">
+                <a:latin typeface="+mn-lt"/>
+                <a:hlinkClick r:id="rId3">
+                  <a:extLst>
+                    <a:ext uri="{A12FA001-AC4F-418D-AE19-62706E023703}">
+                      <ahyp:hlinkClr xmlns:ahyp="http://schemas.microsoft.com/office/drawing/2018/hyperlinkcolor" val="tx"/>
+                    </a:ext>
+                  </a:extLst>
+                </a:hlinkClick>
+              </a:rPr>
+              <a:t>Interactive Dashboard</a:t>
+            </a:r>
+            <a:r>
+              <a:rPr lang="en-US" sz="1400" dirty="0">
+                <a:latin typeface="+mn-lt"/>
+              </a:rPr>
+              <a:t> is available to identify trends for each i</a:t>
+            </a:r>
+            <a:r>
+              <a:rPr lang="en-US" sz="1400" dirty="0"/>
+              <a:t>ndividual departments</a:t>
+            </a:r>
+            <a:endParaRPr lang="en-US" sz="1400" dirty="0">
+              <a:latin typeface="+mn-lt"/>
+            </a:endParaRPr>
+          </a:p>
+        </p:txBody>
+      </p:sp>
     </p:spTree>
   </p:cSld>
+  <p:clrMapOvr>
+    <a:masterClrMapping/>
+  </p:clrMapOvr>
 </p:sld>
 </file>
 
@@ -4588,90 +4594,130 @@
           <a:chExt cx="0" cy="0"/>
         </a:xfrm>
       </p:grpSpPr>
-      <p:pic>
-        <p:nvPicPr>
-          <p:cNvPr descr="FacultyTenureAnalysis_files/figure-pptx/unnamed-chunk-1-1.png" id="0" name="Picture 1"/>
-          <p:cNvPicPr>
-            <a:picLocks noGrp="1" noChangeAspect="1"/>
-          </p:cNvPicPr>
+      <p:sp>
+        <p:nvSpPr>
+          <p:cNvPr id="5" name="Title 4">
+            <a:extLst>
+              <a:ext uri="{FF2B5EF4-FFF2-40B4-BE49-F238E27FC236}">
+                <a16:creationId xmlns:a16="http://schemas.microsoft.com/office/drawing/2014/main" id="{FBBD429B-23E8-1767-1AAA-8A77C2B223F3}"/>
+              </a:ext>
+            </a:extLst>
+          </p:cNvPr>
+          <p:cNvSpPr>
+            <a:spLocks noGrp="1"/>
+          </p:cNvSpPr>
+          <p:nvPr>
+            <p:ph type="title"/>
+          </p:nvPr>
+        </p:nvSpPr>
+        <p:spPr/>
+        <p:txBody>
+          <a:bodyPr/>
+          <a:lstStyle/>
+          <a:p>
+            <a:r>
+              <a:rPr lang="en-US" dirty="0"/>
+              <a:t>Summary </a:t>
+            </a:r>
+          </a:p>
+        </p:txBody>
+      </p:sp>
+      <p:sp>
+        <p:nvSpPr>
+          <p:cNvPr id="6" name="TextBox 5">
+            <a:extLst>
+              <a:ext uri="{FF2B5EF4-FFF2-40B4-BE49-F238E27FC236}">
+                <a16:creationId xmlns:a16="http://schemas.microsoft.com/office/drawing/2014/main" id="{0CCCC5AD-383C-6D12-5084-D7579EC45661}"/>
+              </a:ext>
+            </a:extLst>
+          </p:cNvPr>
+          <p:cNvSpPr txBox="1"/>
           <p:nvPr/>
-        </p:nvPicPr>
-        <p:blipFill>
-          <a:blip r:embed="rId2"/>
-          <a:stretch>
-            <a:fillRect/>
-          </a:stretch>
-        </p:blipFill>
-        <p:spPr bwMode="auto">
+        </p:nvSpPr>
+        <p:spPr>
           <a:xfrm>
-            <a:off x="1181100" y="1193800"/>
-            <a:ext cx="6781800" cy="3390900"/>
+            <a:off x="176170" y="1149292"/>
+            <a:ext cx="8883940" cy="3970318"/>
           </a:xfrm>
           <a:prstGeom prst="rect">
             <a:avLst/>
           </a:prstGeom>
           <a:noFill/>
-          <a:ln w="9525">
-            <a:noFill/>
-            <a:headEnd/>
-            <a:tailEnd/>
-          </a:ln>
         </p:spPr>
-      </p:pic>
+        <p:txBody>
+          <a:bodyPr wrap="square" rtlCol="0">
+            <a:spAutoFit/>
+          </a:bodyPr>
+          <a:lstStyle/>
+          <a:p>
+            <a:pPr marL="285750" indent="-285750">
+              <a:buFont typeface="Arial" panose="020B0604020202020204" pitchFamily="34" charset="0"/>
+              <a:buChar char="•"/>
+            </a:pPr>
+            <a:r>
+              <a:rPr lang="en-US" dirty="0"/>
+              <a:t>Tenure-line (TN) proportion increased 4% from 2016 to 2021, with 2020 being the highest 45%.</a:t>
+            </a:r>
+          </a:p>
+          <a:p>
+            <a:pPr marL="285750" indent="-285750">
+              <a:buFont typeface="Arial" panose="020B0604020202020204" pitchFamily="34" charset="0"/>
+              <a:buChar char="•"/>
+            </a:pPr>
+            <a:r>
+              <a:rPr lang="en-US" dirty="0"/>
+              <a:t>TN proportion for assistant professor and professor both increased 12% and 5% respectively from 2016 to 2021. However, TN proportion for associate professor decreased 3% during 2016-2021.</a:t>
+            </a:r>
+          </a:p>
+          <a:p>
+            <a:pPr marL="285750" indent="-285750">
+              <a:buFont typeface="Arial" panose="020B0604020202020204" pitchFamily="34" charset="0"/>
+              <a:buChar char="•"/>
+            </a:pPr>
+            <a:r>
+              <a:rPr lang="en-US" dirty="0"/>
+              <a:t>Although international, Hispanic, and black faculties used to have 12-17% less TN proportion than Asian and White faculties in 2016, after increases over the years, their TN proportion are similar in 2021 in a range of 45-51%.</a:t>
+            </a:r>
+          </a:p>
+          <a:p>
+            <a:pPr marL="285750" indent="-285750">
+              <a:buFont typeface="Arial" panose="020B0604020202020204" pitchFamily="34" charset="0"/>
+              <a:buChar char="•"/>
+            </a:pPr>
+            <a:r>
+              <a:rPr lang="en-US" dirty="0"/>
+              <a:t>Consistent gender gaps of at least 20% difference in TN proportion still exist for White and Hispanic faculties in 2021. </a:t>
+            </a:r>
+          </a:p>
+          <a:p>
+            <a:pPr marL="285750" indent="-285750">
+              <a:buFont typeface="Arial" panose="020B0604020202020204" pitchFamily="34" charset="0"/>
+              <a:buChar char="•"/>
+            </a:pPr>
+            <a:r>
+              <a:rPr lang="en-US" dirty="0"/>
+              <a:t>TN proportion  of nine departments increased at least 13-40% during 2016-2021, with American Studies increased the most. However, three departments (Econ, Phil, Chem) decreased 11-13</a:t>
+            </a:r>
+            <a:r>
+              <a:rPr lang="en-US"/>
+              <a:t>% from 2016 to 2021. </a:t>
+            </a:r>
+            <a:endParaRPr lang="en-US" dirty="0"/>
+          </a:p>
+          <a:p>
+            <a:pPr marL="285750" indent="-285750">
+              <a:buFont typeface="Arial" panose="020B0604020202020204" pitchFamily="34" charset="0"/>
+              <a:buChar char="•"/>
+            </a:pPr>
+            <a:endParaRPr lang="en-US" dirty="0"/>
+          </a:p>
+        </p:txBody>
+      </p:sp>
     </p:spTree>
   </p:cSld>
-</p:sld>
-</file>
-
-<file path=ppt/slides/slide9.xml><?xml version="1.0" encoding="utf-8"?>
-<p:sld xmlns:a="http://schemas.openxmlformats.org/drawingml/2006/main" xmlns:r="http://schemas.openxmlformats.org/officeDocument/2006/relationships" xmlns:p="http://schemas.openxmlformats.org/presentationml/2006/main">
-  <p:cSld>
-    <p:spTree>
-      <p:nvGrpSpPr>
-        <p:cNvPr id="1" name=""/>
-        <p:cNvGrpSpPr/>
-        <p:nvPr/>
-      </p:nvGrpSpPr>
-      <p:grpSpPr>
-        <a:xfrm>
-          <a:off x="0" y="0"/>
-          <a:ext cx="0" cy="0"/>
-          <a:chOff x="0" y="0"/>
-          <a:chExt cx="0" cy="0"/>
-        </a:xfrm>
-      </p:grpSpPr>
-      <p:pic>
-        <p:nvPicPr>
-          <p:cNvPr descr="FacultyTenureAnalysis_files/figure-pptx/unnamed-chunk-2-1.png" id="0" name="Picture 1"/>
-          <p:cNvPicPr>
-            <a:picLocks noGrp="1" noChangeAspect="1"/>
-          </p:cNvPicPr>
-          <p:nvPr/>
-        </p:nvPicPr>
-        <p:blipFill>
-          <a:blip r:embed="rId2"/>
-          <a:stretch>
-            <a:fillRect/>
-          </a:stretch>
-        </p:blipFill>
-        <p:spPr bwMode="auto">
-          <a:xfrm>
-            <a:off x="1181100" y="1193800"/>
-            <a:ext cx="6781800" cy="3390900"/>
-          </a:xfrm>
-          <a:prstGeom prst="rect">
-            <a:avLst/>
-          </a:prstGeom>
-          <a:noFill/>
-          <a:ln w="9525">
-            <a:noFill/>
-            <a:headEnd/>
-            <a:tailEnd/>
-          </a:ln>
-        </p:spPr>
-      </p:pic>
-    </p:spTree>
-  </p:cSld>
+  <p:clrMapOvr>
+    <a:masterClrMapping/>
+  </p:clrMapOvr>
 </p:sld>
 </file>
 

</xml_diff>